<commit_message>
fixed NA problem in deaths
problem was caused by difference in Lat and Long in confirmed vs deaths files for some countries.  Fixed by specifiying which variable to join by
</commit_message>
<xml_diff>
--- a/COVID19_short_intro.pptx
+++ b/COVID19_short_intro.pptx
@@ -17034,6 +17034,16 @@
               </a:rPr>
               <a:t> </a:t>
             </a:r>
+            <a:br/>
+            <a:r>
+              <a:rPr sz="1800">
+                <a:solidFill>
+                  <a:srgbClr val="4070A0"/>
+                </a:solidFill>
+                <a:latin typeface="Courier"/>
+              </a:rPr>
+              <a:t>  </a:t>
+            </a:r>
             <a:r>
               <a:rPr sz="1800" b="1">
                 <a:solidFill>
@@ -17047,7 +17057,211 @@
               <a:rPr sz="1800">
                 <a:latin typeface="Courier"/>
               </a:rPr>
-              <a:t>(global_deaths) </a:t>
+              <a:t>(global_deaths, </a:t>
+            </a:r>
+            <a:br/>
+            <a:r>
+              <a:rPr sz="1800">
+                <a:latin typeface="Courier"/>
+              </a:rPr>
+              <a:t>            </a:t>
+            </a:r>
+            <a:r>
+              <a:rPr sz="1800">
+                <a:solidFill>
+                  <a:srgbClr val="902000"/>
+                </a:solidFill>
+                <a:latin typeface="Courier"/>
+              </a:rPr>
+              <a:t>by =</a:t>
+            </a:r>
+            <a:r>
+              <a:rPr sz="1800">
+                <a:latin typeface="Courier"/>
+              </a:rPr>
+              <a:t> </a:t>
+            </a:r>
+            <a:r>
+              <a:rPr sz="1800" b="1">
+                <a:solidFill>
+                  <a:srgbClr val="007020"/>
+                </a:solidFill>
+                <a:latin typeface="Courier"/>
+              </a:rPr>
+              <a:t>c</a:t>
+            </a:r>
+            <a:r>
+              <a:rPr sz="1800">
+                <a:latin typeface="Courier"/>
+              </a:rPr>
+              <a:t>(</a:t>
+            </a:r>
+            <a:r>
+              <a:rPr sz="1800">
+                <a:solidFill>
+                  <a:srgbClr val="4070A0"/>
+                </a:solidFill>
+                <a:latin typeface="Courier"/>
+              </a:rPr>
+              <a:t>"Province/State"</a:t>
+            </a:r>
+            <a:r>
+              <a:rPr sz="1800">
+                <a:latin typeface="Courier"/>
+              </a:rPr>
+              <a:t>, </a:t>
+            </a:r>
+            <a:r>
+              <a:rPr sz="1800">
+                <a:solidFill>
+                  <a:srgbClr val="4070A0"/>
+                </a:solidFill>
+                <a:latin typeface="Courier"/>
+              </a:rPr>
+              <a:t>"Country/Region"</a:t>
+            </a:r>
+            <a:r>
+              <a:rPr sz="1800">
+                <a:latin typeface="Courier"/>
+              </a:rPr>
+              <a:t>, </a:t>
+            </a:r>
+            <a:r>
+              <a:rPr sz="1800">
+                <a:solidFill>
+                  <a:srgbClr val="4070A0"/>
+                </a:solidFill>
+                <a:latin typeface="Courier"/>
+              </a:rPr>
+              <a:t>"Date"</a:t>
+            </a:r>
+            <a:r>
+              <a:rPr sz="1800">
+                <a:latin typeface="Courier"/>
+              </a:rPr>
+              <a:t>)) </a:t>
+            </a:r>
+            <a:r>
+              <a:rPr sz="1800">
+                <a:solidFill>
+                  <a:srgbClr val="666666"/>
+                </a:solidFill>
+                <a:latin typeface="Courier"/>
+              </a:rPr>
+              <a:t>%&gt;%</a:t>
+            </a:r>
+            <a:br/>
+            <a:r>
+              <a:rPr sz="1800">
+                <a:solidFill>
+                  <a:srgbClr val="4070A0"/>
+                </a:solidFill>
+                <a:latin typeface="Courier"/>
+              </a:rPr>
+              <a:t>    </a:t>
+            </a:r>
+            <a:r>
+              <a:rPr sz="1800" b="1">
+                <a:solidFill>
+                  <a:srgbClr val="007020"/>
+                </a:solidFill>
+                <a:latin typeface="Courier"/>
+              </a:rPr>
+              <a:t>rename</a:t>
+            </a:r>
+            <a:r>
+              <a:rPr sz="1800">
+                <a:latin typeface="Courier"/>
+              </a:rPr>
+              <a:t>(</a:t>
+            </a:r>
+            <a:r>
+              <a:rPr sz="1800">
+                <a:solidFill>
+                  <a:srgbClr val="902000"/>
+                </a:solidFill>
+                <a:latin typeface="Courier"/>
+              </a:rPr>
+              <a:t>Long =</a:t>
+            </a:r>
+            <a:r>
+              <a:rPr sz="1800">
+                <a:latin typeface="Courier"/>
+              </a:rPr>
+              <a:t> Long.x, </a:t>
+            </a:r>
+            <a:r>
+              <a:rPr sz="1800">
+                <a:solidFill>
+                  <a:srgbClr val="902000"/>
+                </a:solidFill>
+                <a:latin typeface="Courier"/>
+              </a:rPr>
+              <a:t>Lat =</a:t>
+            </a:r>
+            <a:r>
+              <a:rPr sz="1800">
+                <a:latin typeface="Courier"/>
+              </a:rPr>
+              <a:t> Lat.x) </a:t>
+            </a:r>
+            <a:r>
+              <a:rPr sz="1800">
+                <a:solidFill>
+                  <a:srgbClr val="666666"/>
+                </a:solidFill>
+                <a:latin typeface="Courier"/>
+              </a:rPr>
+              <a:t>%&gt;%</a:t>
+            </a:r>
+            <a:br/>
+            <a:r>
+              <a:rPr sz="1800">
+                <a:solidFill>
+                  <a:srgbClr val="4070A0"/>
+                </a:solidFill>
+                <a:latin typeface="Courier"/>
+              </a:rPr>
+              <a:t>  </a:t>
+            </a:r>
+            <a:r>
+              <a:rPr sz="1800" b="1">
+                <a:solidFill>
+                  <a:srgbClr val="007020"/>
+                </a:solidFill>
+                <a:latin typeface="Courier"/>
+              </a:rPr>
+              <a:t>select</a:t>
+            </a:r>
+            <a:r>
+              <a:rPr sz="1800">
+                <a:latin typeface="Courier"/>
+              </a:rPr>
+              <a:t>(</a:t>
+            </a:r>
+            <a:r>
+              <a:rPr sz="1800">
+                <a:solidFill>
+                  <a:srgbClr val="666666"/>
+                </a:solidFill>
+                <a:latin typeface="Courier"/>
+              </a:rPr>
+              <a:t>-</a:t>
+            </a:r>
+            <a:r>
+              <a:rPr sz="1800" b="1">
+                <a:solidFill>
+                  <a:srgbClr val="007020"/>
+                </a:solidFill>
+                <a:latin typeface="Courier"/>
+              </a:rPr>
+              <a:t>c</a:t>
+            </a:r>
+            <a:r>
+              <a:rPr sz="1800">
+                <a:latin typeface="Courier"/>
+              </a:rPr>
+              <a:t>(Lat.y, Long.y)) </a:t>
             </a:r>
             <a:r>
               <a:rPr sz="1800">
@@ -19742,7 +19956,7 @@
               <a:rPr sz="1800">
                 <a:latin typeface="Courier"/>
               </a:rPr>
-              <a:t>## [1] "total worldwide deaths = 319679"</a:t>
+              <a:t>## [1] "total worldwide deaths = 357273"</a:t>
             </a:r>
           </a:p>
           <a:p>
@@ -19753,7 +19967,7 @@
               <a:rPr sz="1800">
                 <a:latin typeface="Courier"/>
               </a:rPr>
-              <a:t>## [1] "total worldwide cases = 5421717"</a:t>
+              <a:t>## [1] "total worldwide cases = 5692083"</a:t>
             </a:r>
           </a:p>
           <a:p>
@@ -19764,7 +19978,7 @@
               <a:rPr sz="1800">
                 <a:latin typeface="Courier"/>
               </a:rPr>
-              <a:t>## [1] "total worldwide deaths per million to date = 42.2208631238788"</a:t>
+              <a:t>## [1] "total worldwide deaths per million to date = 46.305485620758"</a:t>
             </a:r>
           </a:p>
           <a:p>
@@ -20573,7 +20787,15 @@
                       </a:pPr>
                       <a:r>
                         <a:rPr/>
-                        <a:t>Spain</a:t>
+                        <a:t>United</a:t>
+                      </a:r>
+                      <a:r>
+                        <a:rPr/>
+                        <a:t> </a:t>
+                      </a:r>
+                      <a:r>
+                        <a:rPr/>
+                        <a:t>Kingdom</a:t>
                       </a:r>
                     </a:p>
                   </a:txBody>
@@ -20603,7 +20825,7 @@
                       </a:pPr>
                       <a:r>
                         <a:rPr/>
-                        <a:t>236259</a:t>
+                        <a:t>267240</a:t>
                       </a:r>
                     </a:p>
                   </a:txBody>
@@ -20618,7 +20840,7 @@
                       </a:pPr>
                       <a:r>
                         <a:rPr/>
-                        <a:t>28752</a:t>
+                        <a:t>37460</a:t>
                       </a:r>
                     </a:p>
                   </a:txBody>
@@ -20633,7 +20855,7 @@
                       </a:pPr>
                       <a:r>
                         <a:rPr/>
-                        <a:t>614.95313</a:t>
+                        <a:t>551.80741</a:t>
                       </a:r>
                     </a:p>
                   </a:txBody>
@@ -20650,7 +20872,7 @@
                       </a:pPr>
                       <a:r>
                         <a:rPr/>
-                        <a:t>Italy</a:t>
+                        <a:t>Spain</a:t>
                       </a:r>
                     </a:p>
                   </a:txBody>
@@ -20680,7 +20902,7 @@
                       </a:pPr>
                       <a:r>
                         <a:rPr/>
-                        <a:t>231139</a:t>
+                        <a:t>236259</a:t>
                       </a:r>
                     </a:p>
                   </a:txBody>
@@ -20695,7 +20917,7 @@
                       </a:pPr>
                       <a:r>
                         <a:rPr/>
-                        <a:t>33072</a:t>
+                        <a:t>28752</a:t>
                       </a:r>
                     </a:p>
                   </a:txBody>
@@ -20710,7 +20932,7 @@
                       </a:pPr>
                       <a:r>
                         <a:rPr/>
-                        <a:t>546.98975</a:t>
+                        <a:t>614.95313</a:t>
                       </a:r>
                     </a:p>
                   </a:txBody>
@@ -20727,7 +20949,7 @@
                       </a:pPr>
                       <a:r>
                         <a:rPr/>
-                        <a:t>Germany</a:t>
+                        <a:t>Italy</a:t>
                       </a:r>
                     </a:p>
                   </a:txBody>
@@ -20757,7 +20979,7 @@
                       </a:pPr>
                       <a:r>
                         <a:rPr/>
-                        <a:t>181524</a:t>
+                        <a:t>231139</a:t>
                       </a:r>
                     </a:p>
                   </a:txBody>
@@ -20772,7 +20994,7 @@
                       </a:pPr>
                       <a:r>
                         <a:rPr/>
-                        <a:t>8428</a:t>
+                        <a:t>33072</a:t>
                       </a:r>
                     </a:p>
                   </a:txBody>
@@ -20787,7 +21009,7 @@
                       </a:pPr>
                       <a:r>
                         <a:rPr/>
-                        <a:t>100.59206</a:t>
+                        <a:t>546.98975</a:t>
                       </a:r>
                     </a:p>
                   </a:txBody>
@@ -20804,7 +21026,7 @@
                       </a:pPr>
                       <a:r>
                         <a:rPr/>
-                        <a:t>France</a:t>
+                        <a:t>Germany</a:t>
                       </a:r>
                     </a:p>
                   </a:txBody>
@@ -20834,7 +21056,7 @@
                       </a:pPr>
                       <a:r>
                         <a:rPr/>
-                        <a:t>180166</a:t>
+                        <a:t>181524</a:t>
                       </a:r>
                     </a:p>
                   </a:txBody>
@@ -20849,7 +21071,7 @@
                       </a:pPr>
                       <a:r>
                         <a:rPr/>
-                        <a:t>28546</a:t>
+                        <a:t>8428</a:t>
                       </a:r>
                     </a:p>
                   </a:txBody>
@@ -20864,7 +21086,7 @@
                       </a:pPr>
                       <a:r>
                         <a:rPr/>
-                        <a:t>437.32900</a:t>
+                        <a:t>100.59206</a:t>
                       </a:r>
                     </a:p>
                   </a:txBody>
@@ -20881,7 +21103,7 @@
                       </a:pPr>
                       <a:r>
                         <a:rPr/>
-                        <a:t>Turkey</a:t>
+                        <a:t>France</a:t>
                       </a:r>
                     </a:p>
                   </a:txBody>
@@ -20896,7 +21118,7 @@
                       </a:pPr>
                       <a:r>
                         <a:rPr/>
-                        <a:t>Asia</a:t>
+                        <a:t>Europe</a:t>
                       </a:r>
                     </a:p>
                   </a:txBody>
@@ -20911,7 +21133,7 @@
                       </a:pPr>
                       <a:r>
                         <a:rPr/>
-                        <a:t>159797</a:t>
+                        <a:t>180166</a:t>
                       </a:r>
                     </a:p>
                   </a:txBody>
@@ -20926,7 +21148,7 @@
                       </a:pPr>
                       <a:r>
                         <a:rPr/>
-                        <a:t>4431</a:t>
+                        <a:t>28546</a:t>
                       </a:r>
                     </a:p>
                   </a:txBody>
@@ -20941,7 +21163,7 @@
                       </a:pPr>
                       <a:r>
                         <a:rPr/>
-                        <a:t>52.53793</a:t>
+                        <a:t>437.32900</a:t>
                       </a:r>
                     </a:p>
                   </a:txBody>

</xml_diff>